<commit_message>
Updated with new 'How We Start' slide, some addendums to the deliverables noted.
</commit_message>
<xml_diff>
--- a/TechReview_Presentation.pptx
+++ b/TechReview_Presentation.pptx
@@ -3473,28 +3473,28 @@
             <a:pPr lvl="1"/>
             <a:r>
               <a:rPr lang="en-US" dirty="0"/>
-              <a:t>Average particle size (radius)</a:t>
+              <a:t>Average particle size (float radius)</a:t>
             </a:r>
           </a:p>
           <a:p>
             <a:pPr lvl="1"/>
             <a:r>
               <a:rPr lang="en-US" dirty="0"/>
-              <a:t>Particle size distribution (histogram)</a:t>
+              <a:t>Particle size distribution (float average, histogram)</a:t>
             </a:r>
           </a:p>
           <a:p>
             <a:pPr lvl="1"/>
             <a:r>
               <a:rPr lang="en-US" dirty="0"/>
-              <a:t>Measure of how spherical/elliptical the particles are</a:t>
+              <a:t>Measure of how spherical/elliptical the particles are (density plot)</a:t>
             </a:r>
           </a:p>
           <a:p>
             <a:pPr lvl="1"/>
             <a:r>
               <a:rPr lang="en-US" dirty="0"/>
-              <a:t>Stretch: some measure of irregularity/roughness</a:t>
+              <a:t>Stretch: some measure of irregularity/roughness (we’ll figure this out later)</a:t>
             </a:r>
           </a:p>
           <a:p>
@@ -3573,7 +3573,7 @@
           <a:p>
             <a:r>
               <a:rPr lang="en-US" dirty="0"/>
-              <a:t>OpenCV Image Processing Package</a:t>
+              <a:t>How We Start</a:t>
             </a:r>
           </a:p>
         </p:txBody>
@@ -3599,7 +3599,69 @@
           <a:bodyPr/>
           <a:lstStyle/>
           <a:p>
-            <a:endParaRPr lang="en-US"/>
+            <a:r>
+              <a:rPr lang="en-US" dirty="0"/>
+              <a:t>Use Edge detection to separate particles</a:t>
+            </a:r>
+          </a:p>
+          <a:p>
+            <a:pPr lvl="1"/>
+            <a:r>
+              <a:rPr lang="en-US" dirty="0"/>
+              <a:t>Fit curve splines</a:t>
+            </a:r>
+          </a:p>
+          <a:p>
+            <a:pPr lvl="1"/>
+            <a:r>
+              <a:rPr lang="en-US" dirty="0"/>
+              <a:t>Count particles</a:t>
+            </a:r>
+          </a:p>
+          <a:p>
+            <a:endParaRPr lang="en-US" dirty="0"/>
+          </a:p>
+          <a:p>
+            <a:r>
+              <a:rPr lang="en-US" dirty="0"/>
+              <a:t>OpenCV Package</a:t>
+            </a:r>
+          </a:p>
+          <a:p>
+            <a:pPr lvl="1"/>
+            <a:r>
+              <a:rPr lang="en-US" dirty="0"/>
+              <a:t>Open Source Python Package for Image Processing (MIT License)</a:t>
+            </a:r>
+          </a:p>
+          <a:p>
+            <a:pPr lvl="1"/>
+            <a:r>
+              <a:rPr lang="en-US" dirty="0"/>
+              <a:t>Multiple methods of edge detection available for use</a:t>
+            </a:r>
+          </a:p>
+          <a:p>
+            <a:pPr lvl="2"/>
+            <a:r>
+              <a:rPr lang="en-US" dirty="0"/>
+              <a:t>Sobel</a:t>
+            </a:r>
+          </a:p>
+          <a:p>
+            <a:pPr lvl="2"/>
+            <a:r>
+              <a:rPr lang="en-US" dirty="0"/>
+              <a:t>Canny</a:t>
+            </a:r>
+          </a:p>
+          <a:p>
+            <a:pPr lvl="2"/>
+            <a:r>
+              <a:rPr lang="en-US"/>
+              <a:t>Laplace</a:t>
+            </a:r>
+            <a:endParaRPr lang="en-US" dirty="0"/>
           </a:p>
         </p:txBody>
       </p:sp>

</xml_diff>

<commit_message>
Added Canny Edge Detection slides
</commit_message>
<xml_diff>
--- a/TechReview_Presentation.pptx
+++ b/TechReview_Presentation.pptx
@@ -8,9 +8,10 @@
     <p:sldId id="256" r:id="rId2"/>
     <p:sldId id="257" r:id="rId3"/>
     <p:sldId id="261" r:id="rId4"/>
-    <p:sldId id="258" r:id="rId5"/>
+    <p:sldId id="262" r:id="rId5"/>
     <p:sldId id="259" r:id="rId6"/>
     <p:sldId id="260" r:id="rId7"/>
+    <p:sldId id="258" r:id="rId8"/>
   </p:sldIdLst>
   <p:sldSz cx="12192000" cy="6858000"/>
   <p:notesSz cx="6858000" cy="9144000"/>
@@ -109,6 +110,11 @@
       </a:defRPr>
     </a:lvl9pPr>
   </p:defaultTextStyle>
+  <p:extLst>
+    <p:ext uri="{EFAFB233-063F-42B5-8137-9DF3F51BA10A}">
+      <p15:sldGuideLst xmlns:p15="http://schemas.microsoft.com/office/powerpoint/2012/main"/>
+    </p:ext>
+  </p:extLst>
 </p:presentation>
 </file>
 
@@ -259,7 +265,7 @@
           <a:p>
             <a:fld id="{0C65C9FF-3F31-0A45-9B98-91187E9A121A}" type="datetimeFigureOut">
               <a:rPr lang="en-US" smtClean="0"/>
-              <a:t>2/19/19</a:t>
+              <a:t>2/20/2019</a:t>
             </a:fld>
             <a:endParaRPr lang="en-US"/>
           </a:p>
@@ -457,7 +463,7 @@
           <a:p>
             <a:fld id="{0C65C9FF-3F31-0A45-9B98-91187E9A121A}" type="datetimeFigureOut">
               <a:rPr lang="en-US" smtClean="0"/>
-              <a:t>2/19/19</a:t>
+              <a:t>2/20/2019</a:t>
             </a:fld>
             <a:endParaRPr lang="en-US"/>
           </a:p>
@@ -665,7 +671,7 @@
           <a:p>
             <a:fld id="{0C65C9FF-3F31-0A45-9B98-91187E9A121A}" type="datetimeFigureOut">
               <a:rPr lang="en-US" smtClean="0"/>
-              <a:t>2/19/19</a:t>
+              <a:t>2/20/2019</a:t>
             </a:fld>
             <a:endParaRPr lang="en-US"/>
           </a:p>
@@ -863,7 +869,7 @@
           <a:p>
             <a:fld id="{0C65C9FF-3F31-0A45-9B98-91187E9A121A}" type="datetimeFigureOut">
               <a:rPr lang="en-US" smtClean="0"/>
-              <a:t>2/19/19</a:t>
+              <a:t>2/20/2019</a:t>
             </a:fld>
             <a:endParaRPr lang="en-US"/>
           </a:p>
@@ -1138,7 +1144,7 @@
           <a:p>
             <a:fld id="{0C65C9FF-3F31-0A45-9B98-91187E9A121A}" type="datetimeFigureOut">
               <a:rPr lang="en-US" smtClean="0"/>
-              <a:t>2/19/19</a:t>
+              <a:t>2/20/2019</a:t>
             </a:fld>
             <a:endParaRPr lang="en-US"/>
           </a:p>
@@ -1403,7 +1409,7 @@
           <a:p>
             <a:fld id="{0C65C9FF-3F31-0A45-9B98-91187E9A121A}" type="datetimeFigureOut">
               <a:rPr lang="en-US" smtClean="0"/>
-              <a:t>2/19/19</a:t>
+              <a:t>2/20/2019</a:t>
             </a:fld>
             <a:endParaRPr lang="en-US"/>
           </a:p>
@@ -1815,7 +1821,7 @@
           <a:p>
             <a:fld id="{0C65C9FF-3F31-0A45-9B98-91187E9A121A}" type="datetimeFigureOut">
               <a:rPr lang="en-US" smtClean="0"/>
-              <a:t>2/19/19</a:t>
+              <a:t>2/20/2019</a:t>
             </a:fld>
             <a:endParaRPr lang="en-US"/>
           </a:p>
@@ -1956,7 +1962,7 @@
           <a:p>
             <a:fld id="{0C65C9FF-3F31-0A45-9B98-91187E9A121A}" type="datetimeFigureOut">
               <a:rPr lang="en-US" smtClean="0"/>
-              <a:t>2/19/19</a:t>
+              <a:t>2/20/2019</a:t>
             </a:fld>
             <a:endParaRPr lang="en-US"/>
           </a:p>
@@ -2069,7 +2075,7 @@
           <a:p>
             <a:fld id="{0C65C9FF-3F31-0A45-9B98-91187E9A121A}" type="datetimeFigureOut">
               <a:rPr lang="en-US" smtClean="0"/>
-              <a:t>2/19/19</a:t>
+              <a:t>2/20/2019</a:t>
             </a:fld>
             <a:endParaRPr lang="en-US"/>
           </a:p>
@@ -2380,7 +2386,7 @@
           <a:p>
             <a:fld id="{0C65C9FF-3F31-0A45-9B98-91187E9A121A}" type="datetimeFigureOut">
               <a:rPr lang="en-US" smtClean="0"/>
-              <a:t>2/19/19</a:t>
+              <a:t>2/20/2019</a:t>
             </a:fld>
             <a:endParaRPr lang="en-US"/>
           </a:p>
@@ -2668,7 +2674,7 @@
           <a:p>
             <a:fld id="{0C65C9FF-3F31-0A45-9B98-91187E9A121A}" type="datetimeFigureOut">
               <a:rPr lang="en-US" smtClean="0"/>
-              <a:t>2/19/19</a:t>
+              <a:t>2/20/2019</a:t>
             </a:fld>
             <a:endParaRPr lang="en-US"/>
           </a:p>
@@ -2909,7 +2915,7 @@
           <a:p>
             <a:fld id="{0C65C9FF-3F31-0A45-9B98-91187E9A121A}" type="datetimeFigureOut">
               <a:rPr lang="en-US" smtClean="0"/>
-              <a:t>2/19/19</a:t>
+              <a:t>2/20/2019</a:t>
             </a:fld>
             <a:endParaRPr lang="en-US"/>
           </a:p>
@@ -3461,12 +3467,27 @@
         </p:nvSpPr>
         <p:spPr/>
         <p:txBody>
-          <a:bodyPr/>
-          <a:lstStyle/>
-          <a:p>
+          <a:bodyPr>
+            <a:normAutofit lnSpcReduction="10000"/>
+          </a:bodyPr>
+          <a:lstStyle/>
+          <a:p>
+            <a:r>
+              <a:rPr lang="en-US" dirty="0" smtClean="0"/>
+              <a:t>Goal: Analyze characteristics of SEM images</a:t>
+            </a:r>
+          </a:p>
+          <a:p>
+            <a:endParaRPr lang="en-US" dirty="0"/>
+          </a:p>
+          <a:p>
+            <a:r>
+              <a:rPr lang="en-US" dirty="0" smtClean="0"/>
+              <a:t>Deliverables</a:t>
+            </a:r>
             <a:r>
               <a:rPr lang="en-US" dirty="0"/>
-              <a:t>Deliverables:</a:t>
+              <a:t>:</a:t>
             </a:r>
           </a:p>
           <a:p>
@@ -3697,13 +3718,7 @@
       </p:grpSpPr>
       <p:sp>
         <p:nvSpPr>
-          <p:cNvPr id="2" name="Title 1">
-            <a:extLst>
-              <a:ext uri="{FF2B5EF4-FFF2-40B4-BE49-F238E27FC236}">
-                <a16:creationId xmlns:a16="http://schemas.microsoft.com/office/drawing/2014/main" id="{B313C48D-F270-7644-9DC6-9F4EC8C6BF1A}"/>
-              </a:ext>
-            </a:extLst>
-          </p:cNvPr>
+          <p:cNvPr id="2" name="Title 1"/>
           <p:cNvSpPr>
             <a:spLocks noGrp="1"/>
           </p:cNvSpPr>
@@ -3717,47 +3732,58 @@
           <a:lstStyle/>
           <a:p>
             <a:r>
-              <a:rPr lang="en-US" dirty="0"/>
-              <a:t>Sobel Edge Detection</a:t>
-            </a:r>
-          </a:p>
-        </p:txBody>
-      </p:sp>
-      <p:sp>
-        <p:nvSpPr>
-          <p:cNvPr id="3" name="Content Placeholder 2">
-            <a:extLst>
-              <a:ext uri="{FF2B5EF4-FFF2-40B4-BE49-F238E27FC236}">
-                <a16:creationId xmlns:a16="http://schemas.microsoft.com/office/drawing/2014/main" id="{3F36BEE9-182C-B841-8B2E-E56F710EEAA7}"/>
-              </a:ext>
-            </a:extLst>
-          </p:cNvPr>
-          <p:cNvSpPr>
-            <a:spLocks noGrp="1"/>
-          </p:cNvSpPr>
+              <a:rPr lang="en-US" dirty="0" smtClean="0"/>
+              <a:t>Example</a:t>
+            </a:r>
+            <a:endParaRPr lang="en-US" dirty="0"/>
+          </a:p>
+        </p:txBody>
+      </p:sp>
+      <p:pic>
+        <p:nvPicPr>
+          <p:cNvPr id="4" name="Content Placeholder 3"/>
+          <p:cNvPicPr>
+            <a:picLocks noGrp="1" noChangeAspect="1"/>
+          </p:cNvPicPr>
           <p:nvPr>
             <p:ph idx="1"/>
           </p:nvPr>
-        </p:nvSpPr>
-        <p:spPr/>
-        <p:txBody>
-          <a:bodyPr/>
-          <a:lstStyle/>
-          <a:p>
-            <a:endParaRPr lang="en-US"/>
-          </a:p>
-        </p:txBody>
-      </p:sp>
+        </p:nvPicPr>
+        <p:blipFill rotWithShape="1">
+          <a:blip r:embed="rId2">
+            <a:extLst>
+              <a:ext uri="{28A0092B-C50C-407E-A947-70E740481C1C}">
+                <a14:useLocalDpi xmlns:a14="http://schemas.microsoft.com/office/drawing/2010/main" val="0"/>
+              </a:ext>
+            </a:extLst>
+          </a:blip>
+          <a:srcRect l="6928" t="12369" r="6109" b="12740"/>
+          <a:stretch/>
+        </p:blipFill>
+        <p:spPr>
+          <a:xfrm>
+            <a:off x="3450076" y="1690688"/>
+            <a:ext cx="5291847" cy="4557245"/>
+          </a:xfrm>
+        </p:spPr>
+      </p:pic>
     </p:spTree>
     <p:extLst>
       <p:ext uri="{BB962C8B-B14F-4D97-AF65-F5344CB8AC3E}">
-        <p14:creationId xmlns:p14="http://schemas.microsoft.com/office/powerpoint/2010/main" val="3960134182"/>
+        <p14:creationId xmlns:p14="http://schemas.microsoft.com/office/powerpoint/2010/main" val="3810697089"/>
       </p:ext>
     </p:extLst>
   </p:cSld>
   <p:clrMapOvr>
     <a:masterClrMapping/>
   </p:clrMapOvr>
+  <p:timing>
+    <p:tnLst>
+      <p:par>
+        <p:cTn id="1" dur="indefinite" restart="never" nodeType="tmRoot"/>
+      </p:par>
+    </p:tnLst>
+  </p:timing>
 </p:sld>
 </file>
 
@@ -3822,15 +3848,418 @@
             <p:ph idx="1"/>
           </p:nvPr>
         </p:nvSpPr>
-        <p:spPr/>
-        <p:txBody>
-          <a:bodyPr/>
-          <a:lstStyle/>
-          <a:p>
-            <a:endParaRPr lang="en-US"/>
-          </a:p>
-        </p:txBody>
-      </p:sp>
+        <p:spPr>
+          <a:xfrm>
+            <a:off x="838200" y="1825625"/>
+            <a:ext cx="5241587" cy="4351338"/>
+          </a:xfrm>
+        </p:spPr>
+        <p:txBody>
+          <a:bodyPr>
+            <a:normAutofit/>
+          </a:bodyPr>
+          <a:lstStyle/>
+          <a:p>
+            <a:pPr marL="457200" indent="-457200">
+              <a:buFont typeface="+mj-lt"/>
+              <a:buAutoNum type="arabicPeriod"/>
+            </a:pPr>
+            <a:r>
+              <a:rPr lang="en-US" sz="2400" dirty="0" smtClean="0"/>
+              <a:t>Smooth image using Gaussian filter</a:t>
+            </a:r>
+          </a:p>
+          <a:p>
+            <a:pPr lvl="1"/>
+            <a:r>
+              <a:rPr lang="en-US" sz="2000" dirty="0"/>
+              <a:t>N</a:t>
+            </a:r>
+            <a:r>
+              <a:rPr lang="en-US" sz="2000" dirty="0" smtClean="0"/>
+              <a:t>oise filtering</a:t>
+            </a:r>
+          </a:p>
+          <a:p>
+            <a:pPr marL="457200" indent="-457200">
+              <a:buFont typeface="+mj-lt"/>
+              <a:buAutoNum type="arabicPeriod"/>
+            </a:pPr>
+            <a:r>
+              <a:rPr lang="en-US" sz="2400" dirty="0" smtClean="0"/>
+              <a:t>Find intensity gradients </a:t>
+            </a:r>
+          </a:p>
+          <a:p>
+            <a:pPr lvl="1"/>
+            <a:r>
+              <a:rPr lang="en-US" sz="2000" dirty="0"/>
+              <a:t>F</a:t>
+            </a:r>
+            <a:r>
+              <a:rPr lang="en-US" sz="2000" dirty="0" smtClean="0"/>
+              <a:t>irst derivatives</a:t>
+            </a:r>
+          </a:p>
+          <a:p>
+            <a:pPr marL="457200" indent="-457200">
+              <a:buFont typeface="+mj-lt"/>
+              <a:buAutoNum type="arabicPeriod"/>
+            </a:pPr>
+            <a:r>
+              <a:rPr lang="en-US" sz="2400" dirty="0" smtClean="0"/>
+              <a:t>Remove non-maximum peaks</a:t>
+            </a:r>
+          </a:p>
+          <a:p>
+            <a:pPr lvl="1"/>
+            <a:r>
+              <a:rPr lang="en-US" sz="2000" dirty="0" smtClean="0"/>
+              <a:t>Compare to nearby gradients</a:t>
+            </a:r>
+          </a:p>
+          <a:p>
+            <a:pPr marL="457200" indent="-457200">
+              <a:buFont typeface="+mj-lt"/>
+              <a:buAutoNum type="arabicPeriod"/>
+            </a:pPr>
+            <a:r>
+              <a:rPr lang="en-US" sz="2400" dirty="0" smtClean="0"/>
+              <a:t>Mark weak edges </a:t>
+            </a:r>
+          </a:p>
+          <a:p>
+            <a:pPr lvl="1"/>
+            <a:r>
+              <a:rPr lang="en-US" sz="2000" dirty="0"/>
+              <a:t>C</a:t>
+            </a:r>
+            <a:r>
+              <a:rPr lang="en-US" sz="2000" dirty="0" smtClean="0"/>
+              <a:t>aused by true edges, noise, and color</a:t>
+            </a:r>
+          </a:p>
+          <a:p>
+            <a:pPr marL="457200" indent="-457200">
+              <a:buFont typeface="+mj-lt"/>
+              <a:buAutoNum type="arabicPeriod"/>
+            </a:pPr>
+            <a:r>
+              <a:rPr lang="en-US" sz="2400" dirty="0" smtClean="0"/>
+              <a:t>Hysteresis edge tracking</a:t>
+            </a:r>
+          </a:p>
+          <a:p>
+            <a:pPr lvl="1"/>
+            <a:r>
+              <a:rPr lang="en-US" sz="2000" dirty="0" smtClean="0"/>
+              <a:t>Remove edges caused by noise and color</a:t>
+            </a:r>
+            <a:endParaRPr lang="en-US" sz="2000" dirty="0"/>
+          </a:p>
+        </p:txBody>
+      </p:sp>
+      <p:sp>
+        <p:nvSpPr>
+          <p:cNvPr id="6" name="Content Placeholder 2">
+            <a:extLst>
+              <a:ext uri="{FF2B5EF4-FFF2-40B4-BE49-F238E27FC236}">
+                <a16:creationId xmlns:a16="http://schemas.microsoft.com/office/drawing/2014/main" id="{B8073D18-673A-9E48-BFA3-FC0849048CC1}"/>
+              </a:ext>
+            </a:extLst>
+          </p:cNvPr>
+          <p:cNvSpPr txBox="1">
+            <a:spLocks/>
+          </p:cNvSpPr>
+          <p:nvPr/>
+        </p:nvSpPr>
+        <p:spPr>
+          <a:xfrm>
+            <a:off x="6277583" y="1825625"/>
+            <a:ext cx="5241587" cy="4351338"/>
+          </a:xfrm>
+          <a:prstGeom prst="rect">
+            <a:avLst/>
+          </a:prstGeom>
+        </p:spPr>
+        <p:txBody>
+          <a:bodyPr vert="horz" lIns="91440" tIns="45720" rIns="91440" bIns="45720" rtlCol="0">
+            <a:normAutofit/>
+          </a:bodyPr>
+          <a:lstStyle>
+            <a:lvl1pPr marL="228600" indent="-228600" algn="l" defTabSz="914400" rtl="0" eaLnBrk="1" latinLnBrk="0" hangingPunct="1">
+              <a:lnSpc>
+                <a:spcPct val="90000"/>
+              </a:lnSpc>
+              <a:spcBef>
+                <a:spcPts val="1000"/>
+              </a:spcBef>
+              <a:buFont typeface="Arial" panose="020B0604020202020204" pitchFamily="34" charset="0"/>
+              <a:buChar char="•"/>
+              <a:defRPr sz="2800" kern="1200">
+                <a:solidFill>
+                  <a:schemeClr val="tx1"/>
+                </a:solidFill>
+                <a:latin typeface="+mn-lt"/>
+                <a:ea typeface="+mn-ea"/>
+                <a:cs typeface="+mn-cs"/>
+              </a:defRPr>
+            </a:lvl1pPr>
+            <a:lvl2pPr marL="685800" indent="-228600" algn="l" defTabSz="914400" rtl="0" eaLnBrk="1" latinLnBrk="0" hangingPunct="1">
+              <a:lnSpc>
+                <a:spcPct val="90000"/>
+              </a:lnSpc>
+              <a:spcBef>
+                <a:spcPts val="500"/>
+              </a:spcBef>
+              <a:buFont typeface="Arial" panose="020B0604020202020204" pitchFamily="34" charset="0"/>
+              <a:buChar char="•"/>
+              <a:defRPr sz="2400" kern="1200">
+                <a:solidFill>
+                  <a:schemeClr val="tx1"/>
+                </a:solidFill>
+                <a:latin typeface="+mn-lt"/>
+                <a:ea typeface="+mn-ea"/>
+                <a:cs typeface="+mn-cs"/>
+              </a:defRPr>
+            </a:lvl2pPr>
+            <a:lvl3pPr marL="1143000" indent="-228600" algn="l" defTabSz="914400" rtl="0" eaLnBrk="1" latinLnBrk="0" hangingPunct="1">
+              <a:lnSpc>
+                <a:spcPct val="90000"/>
+              </a:lnSpc>
+              <a:spcBef>
+                <a:spcPts val="500"/>
+              </a:spcBef>
+              <a:buFont typeface="Arial" panose="020B0604020202020204" pitchFamily="34" charset="0"/>
+              <a:buChar char="•"/>
+              <a:defRPr sz="2000" kern="1200">
+                <a:solidFill>
+                  <a:schemeClr val="tx1"/>
+                </a:solidFill>
+                <a:latin typeface="+mn-lt"/>
+                <a:ea typeface="+mn-ea"/>
+                <a:cs typeface="+mn-cs"/>
+              </a:defRPr>
+            </a:lvl3pPr>
+            <a:lvl4pPr marL="1600200" indent="-228600" algn="l" defTabSz="914400" rtl="0" eaLnBrk="1" latinLnBrk="0" hangingPunct="1">
+              <a:lnSpc>
+                <a:spcPct val="90000"/>
+              </a:lnSpc>
+              <a:spcBef>
+                <a:spcPts val="500"/>
+              </a:spcBef>
+              <a:buFont typeface="Arial" panose="020B0604020202020204" pitchFamily="34" charset="0"/>
+              <a:buChar char="•"/>
+              <a:defRPr sz="1800" kern="1200">
+                <a:solidFill>
+                  <a:schemeClr val="tx1"/>
+                </a:solidFill>
+                <a:latin typeface="+mn-lt"/>
+                <a:ea typeface="+mn-ea"/>
+                <a:cs typeface="+mn-cs"/>
+              </a:defRPr>
+            </a:lvl4pPr>
+            <a:lvl5pPr marL="2057400" indent="-228600" algn="l" defTabSz="914400" rtl="0" eaLnBrk="1" latinLnBrk="0" hangingPunct="1">
+              <a:lnSpc>
+                <a:spcPct val="90000"/>
+              </a:lnSpc>
+              <a:spcBef>
+                <a:spcPts val="500"/>
+              </a:spcBef>
+              <a:buFont typeface="Arial" panose="020B0604020202020204" pitchFamily="34" charset="0"/>
+              <a:buChar char="•"/>
+              <a:defRPr sz="1800" kern="1200">
+                <a:solidFill>
+                  <a:schemeClr val="tx1"/>
+                </a:solidFill>
+                <a:latin typeface="+mn-lt"/>
+                <a:ea typeface="+mn-ea"/>
+                <a:cs typeface="+mn-cs"/>
+              </a:defRPr>
+            </a:lvl5pPr>
+            <a:lvl6pPr marL="2514600" indent="-228600" algn="l" defTabSz="914400" rtl="0" eaLnBrk="1" latinLnBrk="0" hangingPunct="1">
+              <a:lnSpc>
+                <a:spcPct val="90000"/>
+              </a:lnSpc>
+              <a:spcBef>
+                <a:spcPts val="500"/>
+              </a:spcBef>
+              <a:buFont typeface="Arial" panose="020B0604020202020204" pitchFamily="34" charset="0"/>
+              <a:buChar char="•"/>
+              <a:defRPr sz="1800" kern="1200">
+                <a:solidFill>
+                  <a:schemeClr val="tx1"/>
+                </a:solidFill>
+                <a:latin typeface="+mn-lt"/>
+                <a:ea typeface="+mn-ea"/>
+                <a:cs typeface="+mn-cs"/>
+              </a:defRPr>
+            </a:lvl6pPr>
+            <a:lvl7pPr marL="2971800" indent="-228600" algn="l" defTabSz="914400" rtl="0" eaLnBrk="1" latinLnBrk="0" hangingPunct="1">
+              <a:lnSpc>
+                <a:spcPct val="90000"/>
+              </a:lnSpc>
+              <a:spcBef>
+                <a:spcPts val="500"/>
+              </a:spcBef>
+              <a:buFont typeface="Arial" panose="020B0604020202020204" pitchFamily="34" charset="0"/>
+              <a:buChar char="•"/>
+              <a:defRPr sz="1800" kern="1200">
+                <a:solidFill>
+                  <a:schemeClr val="tx1"/>
+                </a:solidFill>
+                <a:latin typeface="+mn-lt"/>
+                <a:ea typeface="+mn-ea"/>
+                <a:cs typeface="+mn-cs"/>
+              </a:defRPr>
+            </a:lvl7pPr>
+            <a:lvl8pPr marL="3429000" indent="-228600" algn="l" defTabSz="914400" rtl="0" eaLnBrk="1" latinLnBrk="0" hangingPunct="1">
+              <a:lnSpc>
+                <a:spcPct val="90000"/>
+              </a:lnSpc>
+              <a:spcBef>
+                <a:spcPts val="500"/>
+              </a:spcBef>
+              <a:buFont typeface="Arial" panose="020B0604020202020204" pitchFamily="34" charset="0"/>
+              <a:buChar char="•"/>
+              <a:defRPr sz="1800" kern="1200">
+                <a:solidFill>
+                  <a:schemeClr val="tx1"/>
+                </a:solidFill>
+                <a:latin typeface="+mn-lt"/>
+                <a:ea typeface="+mn-ea"/>
+                <a:cs typeface="+mn-cs"/>
+              </a:defRPr>
+            </a:lvl8pPr>
+            <a:lvl9pPr marL="3886200" indent="-228600" algn="l" defTabSz="914400" rtl="0" eaLnBrk="1" latinLnBrk="0" hangingPunct="1">
+              <a:lnSpc>
+                <a:spcPct val="90000"/>
+              </a:lnSpc>
+              <a:spcBef>
+                <a:spcPts val="500"/>
+              </a:spcBef>
+              <a:buFont typeface="Arial" panose="020B0604020202020204" pitchFamily="34" charset="0"/>
+              <a:buChar char="•"/>
+              <a:defRPr sz="1800" kern="1200">
+                <a:solidFill>
+                  <a:schemeClr val="tx1"/>
+                </a:solidFill>
+                <a:latin typeface="+mn-lt"/>
+                <a:ea typeface="+mn-ea"/>
+                <a:cs typeface="+mn-cs"/>
+              </a:defRPr>
+            </a:lvl9pPr>
+          </a:lstStyle>
+          <a:p>
+            <a:pPr marL="0" indent="0">
+              <a:buNone/>
+            </a:pPr>
+            <a:r>
+              <a:rPr lang="en-US" sz="2000" dirty="0" smtClean="0"/>
+              <a:t>Pros</a:t>
+            </a:r>
+          </a:p>
+          <a:p>
+            <a:pPr marL="457200" lvl="1"/>
+            <a:r>
+              <a:rPr lang="en-US" sz="1600" dirty="0" smtClean="0"/>
+              <a:t>Non-maximum suppression and weak edge marking extract edges well</a:t>
+            </a:r>
+          </a:p>
+          <a:p>
+            <a:pPr marL="0" indent="0">
+              <a:buNone/>
+            </a:pPr>
+            <a:r>
+              <a:rPr lang="en-US" sz="2000" dirty="0" smtClean="0"/>
+              <a:t>Cons</a:t>
+            </a:r>
+          </a:p>
+          <a:p>
+            <a:pPr marL="457200" lvl="1"/>
+            <a:r>
+              <a:rPr lang="en-US" sz="1600" dirty="0" smtClean="0"/>
+              <a:t>Fails with very noisy images, requires parameter tuning</a:t>
+            </a:r>
+          </a:p>
+          <a:p>
+            <a:pPr lvl="1"/>
+            <a:endParaRPr lang="en-US" sz="1600" dirty="0" smtClean="0"/>
+          </a:p>
+          <a:p>
+            <a:endParaRPr lang="en-US" sz="2000" dirty="0"/>
+          </a:p>
+        </p:txBody>
+      </p:sp>
+      <p:pic>
+        <p:nvPicPr>
+          <p:cNvPr id="7" name="Content Placeholder 3"/>
+          <p:cNvPicPr>
+            <a:picLocks noChangeAspect="1"/>
+          </p:cNvPicPr>
+          <p:nvPr/>
+        </p:nvPicPr>
+        <p:blipFill rotWithShape="1">
+          <a:blip r:embed="rId2">
+            <a:extLst>
+              <a:ext uri="{28A0092B-C50C-407E-A947-70E740481C1C}">
+                <a14:useLocalDpi xmlns:a14="http://schemas.microsoft.com/office/drawing/2010/main" val="0"/>
+              </a:ext>
+            </a:extLst>
+          </a:blip>
+          <a:srcRect l="6928" t="12369" r="6109" b="51951"/>
+          <a:stretch/>
+        </p:blipFill>
+        <p:spPr>
+          <a:xfrm>
+            <a:off x="6277583" y="3568127"/>
+            <a:ext cx="5291847" cy="2171193"/>
+          </a:xfrm>
+          <a:prstGeom prst="rect">
+            <a:avLst/>
+          </a:prstGeom>
+        </p:spPr>
+      </p:pic>
+      <p:cxnSp>
+        <p:nvCxnSpPr>
+          <p:cNvPr id="9" name="Straight Connector 8"/>
+          <p:cNvCxnSpPr>
+            <a:stCxn id="2" idx="2"/>
+          </p:cNvCxnSpPr>
+          <p:nvPr/>
+        </p:nvCxnSpPr>
+        <p:spPr>
+          <a:xfrm>
+            <a:off x="6096000" y="1690688"/>
+            <a:ext cx="0" cy="4621212"/>
+          </a:xfrm>
+          <a:prstGeom prst="line">
+            <a:avLst/>
+          </a:prstGeom>
+          <a:ln>
+            <a:solidFill>
+              <a:schemeClr val="tx1">
+                <a:lumMod val="50000"/>
+                <a:lumOff val="50000"/>
+              </a:schemeClr>
+            </a:solidFill>
+          </a:ln>
+        </p:spPr>
+        <p:style>
+          <a:lnRef idx="1">
+            <a:schemeClr val="dk1"/>
+          </a:lnRef>
+          <a:fillRef idx="0">
+            <a:schemeClr val="dk1"/>
+          </a:fillRef>
+          <a:effectRef idx="0">
+            <a:schemeClr val="dk1"/>
+          </a:effectRef>
+          <a:fontRef idx="minor">
+            <a:schemeClr val="tx1"/>
+          </a:fontRef>
+        </p:style>
+      </p:cxnSp>
     </p:spTree>
     <p:extLst>
       <p:ext uri="{BB962C8B-B14F-4D97-AF65-F5344CB8AC3E}">
@@ -3841,6 +4270,13 @@
   <p:clrMapOvr>
     <a:masterClrMapping/>
   </p:clrMapOvr>
+  <p:timing>
+    <p:tnLst>
+      <p:par>
+        <p:cTn id="1" dur="indefinite" restart="never" nodeType="tmRoot"/>
+      </p:par>
+    </p:tnLst>
+  </p:timing>
 </p:sld>
 </file>
 
@@ -3918,6 +4354,96 @@
     <p:extLst>
       <p:ext uri="{BB962C8B-B14F-4D97-AF65-F5344CB8AC3E}">
         <p14:creationId xmlns:p14="http://schemas.microsoft.com/office/powerpoint/2010/main" val="682827625"/>
+      </p:ext>
+    </p:extLst>
+  </p:cSld>
+  <p:clrMapOvr>
+    <a:masterClrMapping/>
+  </p:clrMapOvr>
+  <p:timing>
+    <p:tnLst>
+      <p:par>
+        <p:cTn id="1" dur="indefinite" restart="never" nodeType="tmRoot"/>
+      </p:par>
+    </p:tnLst>
+  </p:timing>
+</p:sld>
+</file>
+
+<file path=ppt/slides/slide7.xml><?xml version="1.0" encoding="utf-8"?>
+<p:sld xmlns:a="http://schemas.openxmlformats.org/drawingml/2006/main" xmlns:r="http://schemas.openxmlformats.org/officeDocument/2006/relationships" xmlns:p="http://schemas.openxmlformats.org/presentationml/2006/main">
+  <p:cSld>
+    <p:spTree>
+      <p:nvGrpSpPr>
+        <p:cNvPr id="1" name=""/>
+        <p:cNvGrpSpPr/>
+        <p:nvPr/>
+      </p:nvGrpSpPr>
+      <p:grpSpPr>
+        <a:xfrm>
+          <a:off x="0" y="0"/>
+          <a:ext cx="0" cy="0"/>
+          <a:chOff x="0" y="0"/>
+          <a:chExt cx="0" cy="0"/>
+        </a:xfrm>
+      </p:grpSpPr>
+      <p:sp>
+        <p:nvSpPr>
+          <p:cNvPr id="2" name="Title 1">
+            <a:extLst>
+              <a:ext uri="{FF2B5EF4-FFF2-40B4-BE49-F238E27FC236}">
+                <a16:creationId xmlns:a16="http://schemas.microsoft.com/office/drawing/2014/main" id="{B313C48D-F270-7644-9DC6-9F4EC8C6BF1A}"/>
+              </a:ext>
+            </a:extLst>
+          </p:cNvPr>
+          <p:cNvSpPr>
+            <a:spLocks noGrp="1"/>
+          </p:cNvSpPr>
+          <p:nvPr>
+            <p:ph type="title"/>
+          </p:nvPr>
+        </p:nvSpPr>
+        <p:spPr/>
+        <p:txBody>
+          <a:bodyPr/>
+          <a:lstStyle/>
+          <a:p>
+            <a:r>
+              <a:rPr lang="en-US" dirty="0"/>
+              <a:t>Sobel Edge Detection</a:t>
+            </a:r>
+          </a:p>
+        </p:txBody>
+      </p:sp>
+      <p:sp>
+        <p:nvSpPr>
+          <p:cNvPr id="3" name="Content Placeholder 2">
+            <a:extLst>
+              <a:ext uri="{FF2B5EF4-FFF2-40B4-BE49-F238E27FC236}">
+                <a16:creationId xmlns:a16="http://schemas.microsoft.com/office/drawing/2014/main" id="{3F36BEE9-182C-B841-8B2E-E56F710EEAA7}"/>
+              </a:ext>
+            </a:extLst>
+          </p:cNvPr>
+          <p:cNvSpPr>
+            <a:spLocks noGrp="1"/>
+          </p:cNvSpPr>
+          <p:nvPr>
+            <p:ph idx="1"/>
+          </p:nvPr>
+        </p:nvSpPr>
+        <p:spPr/>
+        <p:txBody>
+          <a:bodyPr/>
+          <a:lstStyle/>
+          <a:p>
+            <a:endParaRPr lang="en-US"/>
+          </a:p>
+        </p:txBody>
+      </p:sp>
+    </p:spTree>
+    <p:extLst>
+      <p:ext uri="{BB962C8B-B14F-4D97-AF65-F5344CB8AC3E}">
+        <p14:creationId xmlns:p14="http://schemas.microsoft.com/office/powerpoint/2010/main" val="3960134182"/>
       </p:ext>
     </p:extLst>
   </p:cSld>

</xml_diff>

<commit_message>
Names are probably good things to have on here...
</commit_message>
<xml_diff>
--- a/TechReview_Presentation.pptx
+++ b/TechReview_Presentation.pptx
@@ -265,7 +265,7 @@
           <a:p>
             <a:fld id="{0C65C9FF-3F31-0A45-9B98-91187E9A121A}" type="datetimeFigureOut">
               <a:rPr lang="en-US" smtClean="0"/>
-              <a:t>2/20/2019</a:t>
+              <a:t>2/21/19</a:t>
             </a:fld>
             <a:endParaRPr lang="en-US"/>
           </a:p>
@@ -463,7 +463,7 @@
           <a:p>
             <a:fld id="{0C65C9FF-3F31-0A45-9B98-91187E9A121A}" type="datetimeFigureOut">
               <a:rPr lang="en-US" smtClean="0"/>
-              <a:t>2/20/2019</a:t>
+              <a:t>2/21/19</a:t>
             </a:fld>
             <a:endParaRPr lang="en-US"/>
           </a:p>
@@ -671,7 +671,7 @@
           <a:p>
             <a:fld id="{0C65C9FF-3F31-0A45-9B98-91187E9A121A}" type="datetimeFigureOut">
               <a:rPr lang="en-US" smtClean="0"/>
-              <a:t>2/20/2019</a:t>
+              <a:t>2/21/19</a:t>
             </a:fld>
             <a:endParaRPr lang="en-US"/>
           </a:p>
@@ -869,7 +869,7 @@
           <a:p>
             <a:fld id="{0C65C9FF-3F31-0A45-9B98-91187E9A121A}" type="datetimeFigureOut">
               <a:rPr lang="en-US" smtClean="0"/>
-              <a:t>2/20/2019</a:t>
+              <a:t>2/21/19</a:t>
             </a:fld>
             <a:endParaRPr lang="en-US"/>
           </a:p>
@@ -1144,7 +1144,7 @@
           <a:p>
             <a:fld id="{0C65C9FF-3F31-0A45-9B98-91187E9A121A}" type="datetimeFigureOut">
               <a:rPr lang="en-US" smtClean="0"/>
-              <a:t>2/20/2019</a:t>
+              <a:t>2/21/19</a:t>
             </a:fld>
             <a:endParaRPr lang="en-US"/>
           </a:p>
@@ -1409,7 +1409,7 @@
           <a:p>
             <a:fld id="{0C65C9FF-3F31-0A45-9B98-91187E9A121A}" type="datetimeFigureOut">
               <a:rPr lang="en-US" smtClean="0"/>
-              <a:t>2/20/2019</a:t>
+              <a:t>2/21/19</a:t>
             </a:fld>
             <a:endParaRPr lang="en-US"/>
           </a:p>
@@ -1821,7 +1821,7 @@
           <a:p>
             <a:fld id="{0C65C9FF-3F31-0A45-9B98-91187E9A121A}" type="datetimeFigureOut">
               <a:rPr lang="en-US" smtClean="0"/>
-              <a:t>2/20/2019</a:t>
+              <a:t>2/21/19</a:t>
             </a:fld>
             <a:endParaRPr lang="en-US"/>
           </a:p>
@@ -1962,7 +1962,7 @@
           <a:p>
             <a:fld id="{0C65C9FF-3F31-0A45-9B98-91187E9A121A}" type="datetimeFigureOut">
               <a:rPr lang="en-US" smtClean="0"/>
-              <a:t>2/20/2019</a:t>
+              <a:t>2/21/19</a:t>
             </a:fld>
             <a:endParaRPr lang="en-US"/>
           </a:p>
@@ -2075,7 +2075,7 @@
           <a:p>
             <a:fld id="{0C65C9FF-3F31-0A45-9B98-91187E9A121A}" type="datetimeFigureOut">
               <a:rPr lang="en-US" smtClean="0"/>
-              <a:t>2/20/2019</a:t>
+              <a:t>2/21/19</a:t>
             </a:fld>
             <a:endParaRPr lang="en-US"/>
           </a:p>
@@ -2386,7 +2386,7 @@
           <a:p>
             <a:fld id="{0C65C9FF-3F31-0A45-9B98-91187E9A121A}" type="datetimeFigureOut">
               <a:rPr lang="en-US" smtClean="0"/>
-              <a:t>2/20/2019</a:t>
+              <a:t>2/21/19</a:t>
             </a:fld>
             <a:endParaRPr lang="en-US"/>
           </a:p>
@@ -2674,7 +2674,7 @@
           <a:p>
             <a:fld id="{0C65C9FF-3F31-0A45-9B98-91187E9A121A}" type="datetimeFigureOut">
               <a:rPr lang="en-US" smtClean="0"/>
-              <a:t>2/20/2019</a:t>
+              <a:t>2/21/19</a:t>
             </a:fld>
             <a:endParaRPr lang="en-US"/>
           </a:p>
@@ -2915,7 +2915,7 @@
           <a:p>
             <a:fld id="{0C65C9FF-3F31-0A45-9B98-91187E9A121A}" type="datetimeFigureOut">
               <a:rPr lang="en-US" smtClean="0"/>
-              <a:t>2/20/2019</a:t>
+              <a:t>2/21/19</a:t>
             </a:fld>
             <a:endParaRPr lang="en-US"/>
           </a:p>
@@ -3383,8 +3383,33 @@
           <a:p>
             <a:r>
               <a:rPr lang="en-US" dirty="0"/>
-              <a:t>Members:</a:t>
-            </a:r>
+              <a:t>Members: Omkar </a:t>
+            </a:r>
+            <a:r>
+              <a:rPr lang="en-US" dirty="0" err="1"/>
+              <a:t>Bhambure</a:t>
+            </a:r>
+            <a:r>
+              <a:rPr lang="en-US" dirty="0"/>
+              <a:t>, </a:t>
+            </a:r>
+            <a:r>
+              <a:rPr lang="en-US" dirty="0" err="1"/>
+              <a:t>Yueyang</a:t>
+            </a:r>
+            <a:r>
+              <a:rPr lang="en-US" dirty="0"/>
+              <a:t> Chen, </a:t>
+            </a:r>
+            <a:r>
+              <a:rPr lang="en-US"/>
+              <a:t>Rachel Gebhart, Isaac </a:t>
+            </a:r>
+            <a:r>
+              <a:rPr lang="en-US" dirty="0" err="1"/>
+              <a:t>Kretzmer</a:t>
+            </a:r>
+            <a:endParaRPr lang="en-US" dirty="0"/>
           </a:p>
           <a:p>
             <a:endParaRPr lang="en-US" dirty="0"/>

</xml_diff>

<commit_message>
1. Used Darktable to pre-proccess images for edge analysis.  Edited images show up in the new folder. 2. Usecase file got started, obviously needs work. 3. Something got changed with the TechReview ppt?  Can't remember what, but it was most definitley something very minor.
</commit_message>
<xml_diff>
--- a/TechReview_Presentation.pptx
+++ b/TechReview_Presentation.pptx
@@ -3399,11 +3399,7 @@
             </a:r>
             <a:r>
               <a:rPr lang="en-US" dirty="0"/>
-              <a:t> Chen, </a:t>
-            </a:r>
-            <a:r>
-              <a:rPr lang="en-US"/>
-              <a:t>Rachel Gebhart, Isaac </a:t>
+              <a:t> Chen, Rachel Gebhart, Isaac </a:t>
             </a:r>
             <a:r>
               <a:rPr lang="en-US" dirty="0" err="1"/>
@@ -3638,12 +3634,14 @@
         </p:nvSpPr>
         <p:spPr/>
         <p:txBody>
-          <a:bodyPr/>
+          <a:bodyPr>
+            <a:normAutofit lnSpcReduction="10000"/>
+          </a:bodyPr>
           <a:lstStyle/>
           <a:p>
             <a:r>
               <a:rPr lang="en-US" dirty="0"/>
-              <a:t>Use Edge detection to separate particles</a:t>
+              <a:t>Use Edge detection to separate particles and create binary</a:t>
             </a:r>
           </a:p>
           <a:p>
@@ -3661,6 +3659,13 @@
             </a:r>
           </a:p>
           <a:p>
+            <a:pPr lvl="1"/>
+            <a:r>
+              <a:rPr lang="en-US" dirty="0"/>
+              <a:t>…all of the analysis!</a:t>
+            </a:r>
+          </a:p>
+          <a:p>
             <a:endParaRPr lang="en-US" dirty="0"/>
           </a:p>
           <a:p>
@@ -3700,10 +3705,9 @@
           <a:p>
             <a:pPr lvl="2"/>
             <a:r>
-              <a:rPr lang="en-US"/>
+              <a:rPr lang="en-US" dirty="0"/>
               <a:t>Laplace</a:t>
             </a:r>
-            <a:endParaRPr lang="en-US" dirty="0"/>
           </a:p>
         </p:txBody>
       </p:sp>
@@ -5109,15 +5113,7 @@
             <a:pPr marL="285750" indent="-285750"/>
             <a:r>
               <a:rPr lang="en-IN" sz="2400" dirty="0"/>
-              <a:t>Size of the </a:t>
-            </a:r>
-            <a:r>
-              <a:rPr lang="en-IN" sz="2400" dirty="0" err="1"/>
-              <a:t>Kernal</a:t>
-            </a:r>
-            <a:r>
-              <a:rPr lang="en-IN" sz="2400" dirty="0"/>
-              <a:t> can be changed</a:t>
+              <a:t>Size of the Kernel can be changed</a:t>
             </a:r>
           </a:p>
           <a:p>

</xml_diff>